<commit_message>
Finished Demo App and Presentation
</commit_message>
<xml_diff>
--- a/Presentation/CosmosDbDotNet.pptx
+++ b/Presentation/CosmosDbDotNet.pptx
@@ -315,7 +315,7 @@
             <a:pPr rtl="0"/>
             <a:fld id="{EED32F08-9749-4F62-92D2-6C50931D99AA}" type="datetime1">
               <a:rPr lang="es-ES" smtClean="0"/>
-              <a:t>22/02/2023</a:t>
+              <a:t>23/02/2023</a:t>
             </a:fld>
             <a:endParaRPr lang="es-ES"/>
           </a:p>
@@ -395,7 +395,7 @@
             <a:pPr rtl="0"/>
             <a:fld id="{6B668C69-0C3E-40A2-B4A0-B2C8B71D8E3A}" type="slidenum">
               <a:rPr lang="es-ES" smtClean="0"/>
-              <a:t>‹Nº›</a:t>
+              <a:t>‹#›</a:t>
             </a:fld>
             <a:endParaRPr lang="es-ES"/>
           </a:p>
@@ -658,7 +658,7 @@
             <a:pPr rtl="0"/>
             <a:fld id="{EE000EEB-8338-48D7-8EE8-EE0082EF7602}" type="slidenum">
               <a:rPr lang="es-ES" noProof="0" smtClean="0"/>
-              <a:t>‹Nº›</a:t>
+              <a:t>‹#›</a:t>
             </a:fld>
             <a:endParaRPr lang="es-ES" noProof="0"/>
           </a:p>
@@ -1492,7 +1492,7 @@
             <a:pPr rtl="0"/>
             <a:fld id="{D57F1E4F-1CFF-5643-939E-02111984F565}" type="slidenum">
               <a:rPr lang="es-ES" noProof="0" smtClean="0"/>
-              <a:t>‹Nº›</a:t>
+              <a:t>‹#›</a:t>
             </a:fld>
             <a:endParaRPr lang="es-ES" noProof="0"/>
           </a:p>
@@ -1787,7 +1787,7 @@
             <a:pPr rtl="0"/>
             <a:fld id="{D57F1E4F-1CFF-5643-939E-02111984F565}" type="slidenum">
               <a:rPr lang="es-ES" noProof="0" smtClean="0"/>
-              <a:t>‹Nº›</a:t>
+              <a:t>‹#›</a:t>
             </a:fld>
             <a:endParaRPr lang="es-ES" noProof="0"/>
           </a:p>
@@ -2039,7 +2039,7 @@
             <a:pPr rtl="0"/>
             <a:fld id="{D57F1E4F-1CFF-5643-939E-02111984F565}" type="slidenum">
               <a:rPr lang="es-ES" noProof="0" smtClean="0"/>
-              <a:t>‹Nº›</a:t>
+              <a:t>‹#›</a:t>
             </a:fld>
             <a:endParaRPr lang="es-ES" noProof="0"/>
           </a:p>
@@ -2583,7 +2583,7 @@
             <a:pPr rtl="0"/>
             <a:fld id="{D57F1E4F-1CFF-5643-939E-02111984F565}" type="slidenum">
               <a:rPr lang="es-ES" noProof="0" smtClean="0"/>
-              <a:t>‹Nº›</a:t>
+              <a:t>‹#›</a:t>
             </a:fld>
             <a:endParaRPr lang="es-ES" noProof="0"/>
           </a:p>
@@ -2835,7 +2835,7 @@
             <a:pPr rtl="0"/>
             <a:fld id="{D57F1E4F-1CFF-5643-939E-02111984F565}" type="slidenum">
               <a:rPr lang="es-ES" noProof="0" smtClean="0"/>
-              <a:t>‹Nº›</a:t>
+              <a:t>‹#›</a:t>
             </a:fld>
             <a:endParaRPr lang="es-ES" noProof="0"/>
           </a:p>
@@ -3371,7 +3371,7 @@
             <a:pPr rtl="0"/>
             <a:fld id="{D57F1E4F-1CFF-5643-939E-02111984F565}" type="slidenum">
               <a:rPr lang="es-ES" noProof="0" smtClean="0"/>
-              <a:t>‹Nº›</a:t>
+              <a:t>‹#›</a:t>
             </a:fld>
             <a:endParaRPr lang="es-ES" noProof="0"/>
           </a:p>
@@ -3672,7 +3672,7 @@
             <a:pPr rtl="0"/>
             <a:fld id="{D57F1E4F-1CFF-5643-939E-02111984F565}" type="slidenum">
               <a:rPr lang="es-ES" noProof="0" smtClean="0"/>
-              <a:t>‹Nº›</a:t>
+              <a:t>‹#›</a:t>
             </a:fld>
             <a:endParaRPr lang="es-ES" noProof="0"/>
           </a:p>
@@ -3850,7 +3850,7 @@
             <a:pPr rtl="0"/>
             <a:fld id="{D57F1E4F-1CFF-5643-939E-02111984F565}" type="slidenum">
               <a:rPr lang="es-ES" noProof="0" smtClean="0"/>
-              <a:t>‹Nº›</a:t>
+              <a:t>‹#›</a:t>
             </a:fld>
             <a:endParaRPr lang="es-ES" noProof="0"/>
           </a:p>
@@ -4034,7 +4034,7 @@
             <a:pPr rtl="0"/>
             <a:fld id="{D57F1E4F-1CFF-5643-939E-02111984F565}" type="slidenum">
               <a:rPr lang="es-ES" noProof="0" smtClean="0"/>
-              <a:t>‹Nº›</a:t>
+              <a:t>‹#›</a:t>
             </a:fld>
             <a:endParaRPr lang="es-ES" noProof="0"/>
           </a:p>
@@ -4213,7 +4213,7 @@
             <a:pPr rtl="0"/>
             <a:fld id="{D57F1E4F-1CFF-5643-939E-02111984F565}" type="slidenum">
               <a:rPr lang="es-ES" noProof="0" smtClean="0"/>
-              <a:t>‹Nº›</a:t>
+              <a:t>‹#›</a:t>
             </a:fld>
             <a:endParaRPr lang="es-ES" noProof="0"/>
           </a:p>
@@ -4463,7 +4463,7 @@
             <a:pPr rtl="0"/>
             <a:fld id="{D57F1E4F-1CFF-5643-939E-02111984F565}" type="slidenum">
               <a:rPr lang="es-ES" noProof="0" smtClean="0"/>
-              <a:t>‹Nº›</a:t>
+              <a:t>‹#›</a:t>
             </a:fld>
             <a:endParaRPr lang="es-ES" noProof="0"/>
           </a:p>
@@ -4764,7 +4764,7 @@
             <a:pPr rtl="0"/>
             <a:fld id="{D57F1E4F-1CFF-5643-939E-02111984F565}" type="slidenum">
               <a:rPr lang="es-ES" noProof="0" smtClean="0"/>
-              <a:t>‹Nº›</a:t>
+              <a:t>‹#›</a:t>
             </a:fld>
             <a:endParaRPr lang="es-ES" noProof="0"/>
           </a:p>
@@ -5210,7 +5210,7 @@
             <a:pPr rtl="0"/>
             <a:fld id="{D57F1E4F-1CFF-5643-939E-02111984F565}" type="slidenum">
               <a:rPr lang="es-ES" noProof="0" smtClean="0"/>
-              <a:t>‹Nº›</a:t>
+              <a:t>‹#›</a:t>
             </a:fld>
             <a:endParaRPr lang="es-ES" noProof="0"/>
           </a:p>
@@ -5332,7 +5332,7 @@
             <a:pPr rtl="0"/>
             <a:fld id="{D57F1E4F-1CFF-5643-939E-02111984F565}" type="slidenum">
               <a:rPr lang="es-ES" noProof="0" smtClean="0"/>
-              <a:t>‹Nº›</a:t>
+              <a:t>‹#›</a:t>
             </a:fld>
             <a:endParaRPr lang="es-ES" noProof="0"/>
           </a:p>
@@ -5431,7 +5431,7 @@
             <a:pPr rtl="0"/>
             <a:fld id="{D57F1E4F-1CFF-5643-939E-02111984F565}" type="slidenum">
               <a:rPr lang="es-ES" noProof="0" smtClean="0"/>
-              <a:t>‹Nº›</a:t>
+              <a:t>‹#›</a:t>
             </a:fld>
             <a:endParaRPr lang="es-ES" noProof="0"/>
           </a:p>
@@ -5718,7 +5718,7 @@
             <a:pPr rtl="0"/>
             <a:fld id="{D57F1E4F-1CFF-5643-939E-02111984F565}" type="slidenum">
               <a:rPr lang="es-ES" noProof="0" smtClean="0"/>
-              <a:t>‹Nº›</a:t>
+              <a:t>‹#›</a:t>
             </a:fld>
             <a:endParaRPr lang="es-ES" noProof="0"/>
           </a:p>
@@ -6013,7 +6013,7 @@
             <a:pPr rtl="0"/>
             <a:fld id="{D57F1E4F-1CFF-5643-939E-02111984F565}" type="slidenum">
               <a:rPr lang="es-ES" noProof="0" smtClean="0"/>
-              <a:t>‹Nº›</a:t>
+              <a:t>‹#›</a:t>
             </a:fld>
             <a:endParaRPr lang="es-ES" noProof="0"/>
           </a:p>
@@ -6583,7 +6583,7 @@
             <a:pPr rtl="0"/>
             <a:fld id="{D57F1E4F-1CFF-5643-939E-02111984F565}" type="slidenum">
               <a:rPr lang="es-ES" noProof="0" smtClean="0"/>
-              <a:t>‹Nº›</a:t>
+              <a:t>‹#›</a:t>
             </a:fld>
             <a:endParaRPr lang="es-ES" noProof="0"/>
           </a:p>
@@ -7831,13 +7831,13 @@
         </p:nvSpPr>
         <p:spPr>
           <a:xfrm>
-            <a:off x="1407460" y="1468072"/>
-            <a:ext cx="10095564" cy="4983061"/>
+            <a:off x="1407460" y="2323750"/>
+            <a:ext cx="10412628" cy="4127383"/>
           </a:xfrm>
         </p:spPr>
         <p:txBody>
           <a:bodyPr>
-            <a:normAutofit/>
+            <a:normAutofit fontScale="92500" lnSpcReduction="10000"/>
           </a:bodyPr>
           <a:lstStyle/>
           <a:p>
@@ -7855,7 +7855,7 @@
             </a:r>
             <a:r>
               <a:rPr lang="es-MX" b="1" dirty="0"/>
-              <a:t> Framework </a:t>
+              <a:t> Framework Core </a:t>
             </a:r>
             <a:r>
               <a:rPr lang="es-MX" b="1" dirty="0" err="1"/>
@@ -7903,7 +7903,7 @@
                 </a:solidFill>
                 <a:latin typeface="Segoe UI" panose="020B0502040204020203" pitchFamily="34" charset="0"/>
               </a:rPr>
-              <a:t>.</a:t>
+              <a:t>. This work</a:t>
             </a:r>
           </a:p>
           <a:p>
@@ -12357,7 +12357,7 @@
                     <a:p>
                       <a:pPr algn="l" fontAlgn="t"/>
                       <a:r>
-                        <a:rPr lang="en-US" sz="1800">
+                        <a:rPr lang="en-US" sz="1800" dirty="0">
                           <a:effectLst/>
                         </a:rPr>
                         <a:t>Manager</a:t>
@@ -14133,24 +14133,6 @@
 </file>
 
 <file path=customXml/item1.xml><?xml version="1.0" encoding="utf-8"?>
-<?mso-contentType ?>
-<FormTemplates xmlns="http://schemas.microsoft.com/sharepoint/v3/contenttype/forms">
-  <Display>DocumentLibraryForm</Display>
-  <Edit>DocumentLibraryForm</Edit>
-  <New>DocumentLibraryForm</New>
-</FormTemplates>
-</file>
-
-<file path=customXml/item2.xml><?xml version="1.0" encoding="utf-8"?>
-<p:properties xmlns:p="http://schemas.microsoft.com/office/2006/metadata/properties" xmlns:xsi="http://www.w3.org/2001/XMLSchema-instance" xmlns:pc="http://schemas.microsoft.com/office/infopath/2007/PartnerControls">
-  <documentManagement>
-    <Status xmlns="71af3243-3dd4-4a8d-8c0d-dd76da1f02a5">Not started</Status>
-    <MediaServiceKeyPoints xmlns="71af3243-3dd4-4a8d-8c0d-dd76da1f02a5" xsi:nil="true"/>
-  </documentManagement>
-</p:properties>
-</file>
-
-<file path=customXml/item3.xml><?xml version="1.0" encoding="utf-8"?>
 <ct:contentTypeSchema xmlns:ct="http://schemas.microsoft.com/office/2006/metadata/contentType" xmlns:ma="http://schemas.microsoft.com/office/2006/metadata/properties/metaAttributes" ct:_="" ma:_="" ma:contentTypeName="Document" ma:contentTypeID="0x01010079F111ED35F8CC479449609E8A0923A6" ma:contentTypeVersion="12" ma:contentTypeDescription="Create a new document." ma:contentTypeScope="" ma:versionID="93813dd7ca6ad654711aa0ab317e03a3">
   <xsd:schema xmlns:xsd="http://www.w3.org/2001/XMLSchema" xmlns:xs="http://www.w3.org/2001/XMLSchema" xmlns:p="http://schemas.microsoft.com/office/2006/metadata/properties" xmlns:ns2="71af3243-3dd4-4a8d-8c0d-dd76da1f02a5" xmlns:ns3="16c05727-aa75-4e4a-9b5f-8a80a1165891" targetNamespace="http://schemas.microsoft.com/office/2006/metadata/properties" ma:root="true" ma:fieldsID="f11dc0ce689dd3925e84e4e35398c6e7" ns2:_="" ns3:_="">
     <xsd:import namespace="71af3243-3dd4-4a8d-8c0d-dd76da1f02a5"/>
@@ -14371,25 +14353,25 @@
 </ct:contentTypeSchema>
 </file>
 
-<file path=customXml/itemProps1.xml><?xml version="1.0" encoding="utf-8"?>
-<ds:datastoreItem xmlns:ds="http://schemas.openxmlformats.org/officeDocument/2006/customXml" ds:itemID="{0D16958A-754B-4396-9457-FD7A427A37DD}">
-  <ds:schemaRefs>
-    <ds:schemaRef ds:uri="http://schemas.microsoft.com/sharepoint/v3/contenttype/forms"/>
-  </ds:schemaRefs>
-</ds:datastoreItem>
+<file path=customXml/item2.xml><?xml version="1.0" encoding="utf-8"?>
+<p:properties xmlns:p="http://schemas.microsoft.com/office/2006/metadata/properties" xmlns:xsi="http://www.w3.org/2001/XMLSchema-instance" xmlns:pc="http://schemas.microsoft.com/office/infopath/2007/PartnerControls">
+  <documentManagement>
+    <Status xmlns="71af3243-3dd4-4a8d-8c0d-dd76da1f02a5">Not started</Status>
+    <MediaServiceKeyPoints xmlns="71af3243-3dd4-4a8d-8c0d-dd76da1f02a5" xsi:nil="true"/>
+  </documentManagement>
+</p:properties>
 </file>
 
-<file path=customXml/itemProps2.xml><?xml version="1.0" encoding="utf-8"?>
-<ds:datastoreItem xmlns:ds="http://schemas.openxmlformats.org/officeDocument/2006/customXml" ds:itemID="{048C88F1-1664-415F-AFCE-F6CF45809817}">
-  <ds:schemaRefs>
-    <ds:schemaRef ds:uri="http://schemas.microsoft.com/office/2006/metadata/properties"/>
-    <ds:schemaRef ds:uri="http://schemas.microsoft.com/office/infopath/2007/PartnerControls"/>
-    <ds:schemaRef ds:uri="71af3243-3dd4-4a8d-8c0d-dd76da1f02a5"/>
-  </ds:schemaRefs>
-</ds:datastoreItem>
+<file path=customXml/item3.xml><?xml version="1.0" encoding="utf-8"?>
+<?mso-contentType ?>
+<FormTemplates xmlns="http://schemas.microsoft.com/sharepoint/v3/contenttype/forms">
+  <Display>DocumentLibraryForm</Display>
+  <Edit>DocumentLibraryForm</Edit>
+  <New>DocumentLibraryForm</New>
+</FormTemplates>
 </file>
 
-<file path=customXml/itemProps3.xml><?xml version="1.0" encoding="utf-8"?>
+<file path=customXml/itemProps1.xml><?xml version="1.0" encoding="utf-8"?>
 <ds:datastoreItem xmlns:ds="http://schemas.openxmlformats.org/officeDocument/2006/customXml" ds:itemID="{CC30393A-FEC6-4A44-9E4A-6EA49F1F7DC0}">
   <ds:schemaRefs>
     <ds:schemaRef ds:uri="http://schemas.microsoft.com/office/2006/metadata/contentType"/>
@@ -14406,4 +14388,22 @@
     <ds:schemaRef ds:uri="http://schemas.microsoft.com/internal/obd"/>
   </ds:schemaRefs>
 </ds:datastoreItem>
+</file>
+
+<file path=customXml/itemProps2.xml><?xml version="1.0" encoding="utf-8"?>
+<ds:datastoreItem xmlns:ds="http://schemas.openxmlformats.org/officeDocument/2006/customXml" ds:itemID="{048C88F1-1664-415F-AFCE-F6CF45809817}">
+  <ds:schemaRefs>
+    <ds:schemaRef ds:uri="http://schemas.microsoft.com/office/2006/metadata/properties"/>
+    <ds:schemaRef ds:uri="http://schemas.microsoft.com/office/infopath/2007/PartnerControls"/>
+    <ds:schemaRef ds:uri="71af3243-3dd4-4a8d-8c0d-dd76da1f02a5"/>
+  </ds:schemaRefs>
+</ds:datastoreItem>
+</file>
+
+<file path=customXml/itemProps3.xml><?xml version="1.0" encoding="utf-8"?>
+<ds:datastoreItem xmlns:ds="http://schemas.openxmlformats.org/officeDocument/2006/customXml" ds:itemID="{0D16958A-754B-4396-9457-FD7A427A37DD}">
+  <ds:schemaRefs>
+    <ds:schemaRef ds:uri="http://schemas.microsoft.com/sharepoint/v3/contenttype/forms"/>
+  </ds:schemaRefs>
+</ds:datastoreItem>
 </file>
</xml_diff>